<commit_message>
created working presentation string for v7
</commit_message>
<xml_diff>
--- a/powerpoint1.pptx
+++ b/powerpoint1.pptx
@@ -2,15 +2,11 @@
 <file path=ppt/presentation.xml><?xml version="1.0" encoding="utf-8"?>
 <p:presentation xmlns:a="http://schemas.openxmlformats.org/drawingml/2006/main" xmlns:r="http://schemas.openxmlformats.org/officeDocument/2006/relationships" xmlns:p="http://schemas.openxmlformats.org/presentationml/2006/main" saveSubsetFonts="1">
   <p:sldMasterIdLst>
-    <p:sldMasterId id="2147483660" r:id="rId1"/>
+    <p:sldMasterId id="2147483660" r:id="rId4"/>
   </p:sldMasterIdLst>
   <p:sldIdLst>
-    <p:sldId id="256" r:id="rId2"/>
-    <p:sldId id="257" r:id="rId3"/>
-    <p:sldId id="258" r:id="rId4"/>
-    <p:sldId id="259" r:id="rId5"/>
-    <p:sldId id="260" r:id="rId6"/>
-    <p:sldId id="261" r:id="rId7"/>
+    <p:sldId id="256" r:id="rId5"/>
+    <p:sldId id="257" r:id="rId6"/>
   </p:sldIdLst>
   <p:sldSz cx="12192000" cy="6858000"/>
   <p:notesSz cx="6858000" cy="9144000"/>
@@ -109,6 +105,11 @@
       </a:defRPr>
     </a:lvl9pPr>
   </p:defaultTextStyle>
+  <p:extLst>
+    <p:ext uri="{EFAFB233-063F-42B5-8137-9DF3F51BA10A}">
+      <p15:sldGuideLst xmlns:p15="http://schemas.microsoft.com/office/powerpoint/2012/main"/>
+    </p:ext>
+  </p:extLst>
 </p:presentation>
 </file>
 
@@ -355,7 +356,7 @@
           <a:p>
             <a:fld id="{72DA9259-FA67-4F94-A1FA-19D3606B534F}" type="datetimeFigureOut">
               <a:rPr lang="en-US" smtClean="0"/>
-              <a:t>10/15/2024</a:t>
+              <a:t>11/27/2024</a:t>
             </a:fld>
             <a:endParaRPr lang="en-US"/>
           </a:p>
@@ -525,7 +526,7 @@
           <a:p>
             <a:fld id="{72DA9259-FA67-4F94-A1FA-19D3606B534F}" type="datetimeFigureOut">
               <a:rPr lang="en-US" smtClean="0"/>
-              <a:t>10/15/2024</a:t>
+              <a:t>11/27/2024</a:t>
             </a:fld>
             <a:endParaRPr lang="en-US"/>
           </a:p>
@@ -705,7 +706,7 @@
           <a:p>
             <a:fld id="{72DA9259-FA67-4F94-A1FA-19D3606B534F}" type="datetimeFigureOut">
               <a:rPr lang="en-US" smtClean="0"/>
-              <a:t>10/15/2024</a:t>
+              <a:t>11/27/2024</a:t>
             </a:fld>
             <a:endParaRPr lang="en-US"/>
           </a:p>
@@ -875,7 +876,7 @@
           <a:p>
             <a:fld id="{72DA9259-FA67-4F94-A1FA-19D3606B534F}" type="datetimeFigureOut">
               <a:rPr lang="en-US" smtClean="0"/>
-              <a:t>10/15/2024</a:t>
+              <a:t>11/27/2024</a:t>
             </a:fld>
             <a:endParaRPr lang="en-US"/>
           </a:p>
@@ -1121,7 +1122,7 @@
           <a:p>
             <a:fld id="{72DA9259-FA67-4F94-A1FA-19D3606B534F}" type="datetimeFigureOut">
               <a:rPr lang="en-US" smtClean="0"/>
-              <a:t>10/15/2024</a:t>
+              <a:t>11/27/2024</a:t>
             </a:fld>
             <a:endParaRPr lang="en-US"/>
           </a:p>
@@ -1353,7 +1354,7 @@
           <a:p>
             <a:fld id="{72DA9259-FA67-4F94-A1FA-19D3606B534F}" type="datetimeFigureOut">
               <a:rPr lang="en-US" smtClean="0"/>
-              <a:t>10/15/2024</a:t>
+              <a:t>11/27/2024</a:t>
             </a:fld>
             <a:endParaRPr lang="en-US"/>
           </a:p>
@@ -1720,7 +1721,7 @@
           <a:p>
             <a:fld id="{72DA9259-FA67-4F94-A1FA-19D3606B534F}" type="datetimeFigureOut">
               <a:rPr lang="en-US" smtClean="0"/>
-              <a:t>10/15/2024</a:t>
+              <a:t>11/27/2024</a:t>
             </a:fld>
             <a:endParaRPr lang="en-US"/>
           </a:p>
@@ -1838,7 +1839,7 @@
           <a:p>
             <a:fld id="{72DA9259-FA67-4F94-A1FA-19D3606B534F}" type="datetimeFigureOut">
               <a:rPr lang="en-US" smtClean="0"/>
-              <a:t>10/15/2024</a:t>
+              <a:t>11/27/2024</a:t>
             </a:fld>
             <a:endParaRPr lang="en-US"/>
           </a:p>
@@ -1933,7 +1934,7 @@
           <a:p>
             <a:fld id="{72DA9259-FA67-4F94-A1FA-19D3606B534F}" type="datetimeFigureOut">
               <a:rPr lang="en-US" smtClean="0"/>
-              <a:t>10/15/2024</a:t>
+              <a:t>11/27/2024</a:t>
             </a:fld>
             <a:endParaRPr lang="en-US"/>
           </a:p>
@@ -2210,7 +2211,7 @@
           <a:p>
             <a:fld id="{72DA9259-FA67-4F94-A1FA-19D3606B534F}" type="datetimeFigureOut">
               <a:rPr lang="en-US" smtClean="0"/>
-              <a:t>10/15/2024</a:t>
+              <a:t>11/27/2024</a:t>
             </a:fld>
             <a:endParaRPr lang="en-US"/>
           </a:p>
@@ -2467,7 +2468,7 @@
           <a:p>
             <a:fld id="{72DA9259-FA67-4F94-A1FA-19D3606B534F}" type="datetimeFigureOut">
               <a:rPr lang="en-US" smtClean="0"/>
-              <a:t>10/15/2024</a:t>
+              <a:t>11/27/2024</a:t>
             </a:fld>
             <a:endParaRPr lang="en-US"/>
           </a:p>
@@ -2680,7 +2681,7 @@
           <a:p>
             <a:fld id="{72DA9259-FA67-4F94-A1FA-19D3606B534F}" type="datetimeFigureOut">
               <a:rPr lang="en-US" smtClean="0"/>
-              <a:t>10/15/2024</a:t>
+              <a:t>11/27/2024</a:t>
             </a:fld>
             <a:endParaRPr lang="en-US"/>
           </a:p>
@@ -3112,31 +3113,30 @@
           <a:lstStyle/>
           <a:p>
             <a:r>
-              <a:rPr lang="ru-RU" dirty="0"/>
-              <a:t>Мне есть за что благодарить Творца</a:t>
+              <a:rPr lang="en-US" dirty="0"/>
+              <a:t>Line one</a:t>
             </a:r>
             <a:br>
-              <a:rPr lang="ru-RU" dirty="0"/>
+              <a:rPr lang="en-US" dirty="0"/>
             </a:br>
             <a:r>
-              <a:rPr lang="ru-RU" dirty="0"/>
-              <a:t>Он снял с меня греховную проказу</a:t>
+              <a:rPr lang="en-US" dirty="0"/>
+              <a:t>Line two</a:t>
             </a:r>
             <a:br>
-              <a:rPr lang="ru-RU" dirty="0"/>
+              <a:rPr lang="en-US" dirty="0"/>
             </a:br>
             <a:r>
-              <a:rPr lang="ru-RU" dirty="0"/>
-              <a:t>О пусть теперь польется без конца</a:t>
+              <a:rPr lang="en-US" dirty="0"/>
+              <a:t>Line three</a:t>
             </a:r>
             <a:br>
-              <a:rPr lang="ru-RU" dirty="0"/>
+              <a:rPr lang="en-US" dirty="0"/>
             </a:br>
             <a:r>
-              <a:rPr lang="ru-RU" dirty="0"/>
-              <a:t>Хвала ему в поэмах и рассказах</a:t>
-            </a:r>
-            <a:endParaRPr lang="en-US" dirty="0"/>
+              <a:rPr lang="en-US" dirty="0"/>
+              <a:t>Line four</a:t>
+            </a:r>
           </a:p>
         </p:txBody>
       </p:sp>
@@ -3158,7 +3158,13 @@
   <p:cSld>
     <p:spTree>
       <p:nvGrpSpPr>
-        <p:cNvPr id="1" name=""/>
+        <p:cNvPr id="1" name="">
+          <a:extLst>
+            <a:ext uri="{FF2B5EF4-FFF2-40B4-BE49-F238E27FC236}">
+              <a16:creationId xmlns:a16="http://schemas.microsoft.com/office/drawing/2014/main" id="{FDCE8EFF-A6C0-CB3F-35A4-F1CE95D2A4FA}"/>
+            </a:ext>
+          </a:extLst>
+        </p:cNvPr>
         <p:cNvGrpSpPr/>
         <p:nvPr/>
       </p:nvGrpSpPr>
@@ -3175,7 +3181,7 @@
           <p:cNvPr id="2" name="Title 1">
             <a:extLst>
               <a:ext uri="{FF2B5EF4-FFF2-40B4-BE49-F238E27FC236}">
-                <a16:creationId xmlns:a16="http://schemas.microsoft.com/office/drawing/2014/main" id="{BFDA464E-37E7-7D61-6E99-ACD35979E289}"/>
+                <a16:creationId xmlns:a16="http://schemas.microsoft.com/office/drawing/2014/main" id="{2E4D5ACB-51EE-D9B2-7771-23CC4E678A0B}"/>
               </a:ext>
             </a:extLst>
           </p:cNvPr>
@@ -3197,29 +3203,57 @@
           <a:lstStyle/>
           <a:p>
             <a:r>
-              <a:rPr lang="ru-RU" dirty="0"/>
-              <a:t>Вот почему мне хочется любить</a:t>
+              <a:rPr lang="en-US" dirty="0"/>
+              <a:t>Line one</a:t>
             </a:r>
             <a:br>
-              <a:rPr lang="ru-RU" dirty="0"/>
+              <a:rPr lang="en-US" dirty="0"/>
             </a:br>
             <a:r>
-              <a:rPr lang="ru-RU" dirty="0"/>
-              <a:t>Его сильней, и искренней, и чище</a:t>
+              <a:rPr lang="en-US" dirty="0"/>
+              <a:t>Line two</a:t>
             </a:r>
             <a:br>
-              <a:rPr lang="ru-RU" dirty="0"/>
+              <a:rPr lang="en-US" dirty="0"/>
             </a:br>
             <a:r>
-              <a:rPr lang="ru-RU" dirty="0"/>
-              <a:t>Мне есть за что Христа благодарить</a:t>
+              <a:rPr lang="en-US" dirty="0"/>
+              <a:t>Line three</a:t>
             </a:r>
             <a:br>
-              <a:rPr lang="ru-RU" dirty="0"/>
+              <a:rPr lang="en-US" dirty="0"/>
             </a:br>
             <a:r>
-              <a:rPr lang="ru-RU" dirty="0"/>
-              <a:t>Он мне купил небесное жилище</a:t>
+              <a:rPr lang="en-US" dirty="0"/>
+              <a:t>Line four</a:t>
+            </a:r>
+            <a:br>
+              <a:rPr lang="en-US" dirty="0"/>
+            </a:br>
+            <a:r>
+              <a:rPr lang="en-US"/>
+              <a:t>Line five</a:t>
+            </a:r>
+            <a:br>
+              <a:rPr lang="en-US"/>
+            </a:br>
+            <a:r>
+              <a:rPr lang="en-US"/>
+              <a:t>Line 6</a:t>
+            </a:r>
+            <a:br>
+              <a:rPr lang="en-US"/>
+            </a:br>
+            <a:r>
+              <a:rPr lang="en-US"/>
+              <a:t>Line 7</a:t>
+            </a:r>
+            <a:br>
+              <a:rPr lang="en-US"/>
+            </a:br>
+            <a:r>
+              <a:rPr lang="en-US"/>
+              <a:t>Line 8</a:t>
             </a:r>
             <a:endParaRPr lang="en-US" dirty="0"/>
           </a:p>
@@ -3228,358 +3262,7 @@
     </p:spTree>
     <p:extLst>
       <p:ext uri="{BB962C8B-B14F-4D97-AF65-F5344CB8AC3E}">
-        <p14:creationId xmlns:p14="http://schemas.microsoft.com/office/powerpoint/2010/main" val="3350942817"/>
-      </p:ext>
-    </p:extLst>
-  </p:cSld>
-  <p:clrMapOvr>
-    <a:masterClrMapping/>
-  </p:clrMapOvr>
-</p:sld>
-</file>
-
-<file path=ppt/slides/slide3.xml><?xml version="1.0" encoding="utf-8"?>
-<p:sld xmlns:a="http://schemas.openxmlformats.org/drawingml/2006/main" xmlns:r="http://schemas.openxmlformats.org/officeDocument/2006/relationships" xmlns:p="http://schemas.openxmlformats.org/presentationml/2006/main">
-  <p:cSld>
-    <p:spTree>
-      <p:nvGrpSpPr>
-        <p:cNvPr id="1" name=""/>
-        <p:cNvGrpSpPr/>
-        <p:nvPr/>
-      </p:nvGrpSpPr>
-      <p:grpSpPr>
-        <a:xfrm>
-          <a:off x="0" y="0"/>
-          <a:ext cx="0" cy="0"/>
-          <a:chOff x="0" y="0"/>
-          <a:chExt cx="0" cy="0"/>
-        </a:xfrm>
-      </p:grpSpPr>
-      <p:sp>
-        <p:nvSpPr>
-          <p:cNvPr id="2" name="Title 1">
-            <a:extLst>
-              <a:ext uri="{FF2B5EF4-FFF2-40B4-BE49-F238E27FC236}">
-                <a16:creationId xmlns:a16="http://schemas.microsoft.com/office/drawing/2014/main" id="{BFDA464E-37E7-7D61-6E99-ACD35979E289}"/>
-              </a:ext>
-            </a:extLst>
-          </p:cNvPr>
-          <p:cNvSpPr>
-            <a:spLocks noGrp="1"/>
-          </p:cNvSpPr>
-          <p:nvPr>
-            <p:ph type="ctrTitle"/>
-          </p:nvPr>
-        </p:nvSpPr>
-        <p:spPr>
-          <a:xfrm>
-            <a:off x="0" y="0"/>
-            <a:ext cx="12192000" cy="6858000"/>
-          </a:xfrm>
-        </p:spPr>
-        <p:txBody>
-          <a:bodyPr anchor="ctr"/>
-          <a:lstStyle/>
-          <a:p>
-            <a:r>
-              <a:rPr lang="ru-RU" dirty="0"/>
-              <a:t>Душа взывать к Христу не устает</a:t>
-            </a:r>
-            <a:br>
-              <a:rPr lang="ru-RU" dirty="0"/>
-            </a:br>
-            <a:r>
-              <a:rPr lang="ru-RU" dirty="0"/>
-              <a:t>Где падала – прощения просила</a:t>
-            </a:r>
-            <a:br>
-              <a:rPr lang="ru-RU" dirty="0"/>
-            </a:br>
-            <a:r>
-              <a:rPr lang="ru-RU" dirty="0"/>
-              <a:t>Ведь Он в беде мне руку подает</a:t>
-            </a:r>
-            <a:br>
-              <a:rPr lang="ru-RU" dirty="0"/>
-            </a:br>
-            <a:r>
-              <a:rPr lang="ru-RU" dirty="0"/>
-              <a:t>Ведь Он один – прибежище и сила</a:t>
-            </a:r>
-            <a:endParaRPr lang="en-US" dirty="0"/>
-          </a:p>
-        </p:txBody>
-      </p:sp>
-    </p:spTree>
-    <p:extLst>
-      <p:ext uri="{BB962C8B-B14F-4D97-AF65-F5344CB8AC3E}">
-        <p14:creationId xmlns:p14="http://schemas.microsoft.com/office/powerpoint/2010/main" val="292070290"/>
-      </p:ext>
-    </p:extLst>
-  </p:cSld>
-  <p:clrMapOvr>
-    <a:masterClrMapping/>
-  </p:clrMapOvr>
-</p:sld>
-</file>
-
-<file path=ppt/slides/slide4.xml><?xml version="1.0" encoding="utf-8"?>
-<p:sld xmlns:a="http://schemas.openxmlformats.org/drawingml/2006/main" xmlns:r="http://schemas.openxmlformats.org/officeDocument/2006/relationships" xmlns:p="http://schemas.openxmlformats.org/presentationml/2006/main">
-  <p:cSld>
-    <p:spTree>
-      <p:nvGrpSpPr>
-        <p:cNvPr id="1" name=""/>
-        <p:cNvGrpSpPr/>
-        <p:nvPr/>
-      </p:nvGrpSpPr>
-      <p:grpSpPr>
-        <a:xfrm>
-          <a:off x="0" y="0"/>
-          <a:ext cx="0" cy="0"/>
-          <a:chOff x="0" y="0"/>
-          <a:chExt cx="0" cy="0"/>
-        </a:xfrm>
-      </p:grpSpPr>
-      <p:sp>
-        <p:nvSpPr>
-          <p:cNvPr id="2" name="Title 1">
-            <a:extLst>
-              <a:ext uri="{FF2B5EF4-FFF2-40B4-BE49-F238E27FC236}">
-                <a16:creationId xmlns:a16="http://schemas.microsoft.com/office/drawing/2014/main" id="{BFDA464E-37E7-7D61-6E99-ACD35979E289}"/>
-              </a:ext>
-            </a:extLst>
-          </p:cNvPr>
-          <p:cNvSpPr>
-            <a:spLocks noGrp="1"/>
-          </p:cNvSpPr>
-          <p:nvPr>
-            <p:ph type="ctrTitle"/>
-          </p:nvPr>
-        </p:nvSpPr>
-        <p:spPr>
-          <a:xfrm>
-            <a:off x="0" y="0"/>
-            <a:ext cx="12192000" cy="6858000"/>
-          </a:xfrm>
-        </p:spPr>
-        <p:txBody>
-          <a:bodyPr anchor="ctr"/>
-          <a:lstStyle/>
-          <a:p>
-            <a:r>
-              <a:rPr lang="ru-RU" dirty="0"/>
-              <a:t>Вот почему мне хочется любить</a:t>
-            </a:r>
-            <a:br>
-              <a:rPr lang="ru-RU" dirty="0"/>
-            </a:br>
-            <a:r>
-              <a:rPr lang="ru-RU" dirty="0"/>
-              <a:t>Его сильней, и искренней, и чище</a:t>
-            </a:r>
-            <a:br>
-              <a:rPr lang="ru-RU" dirty="0"/>
-            </a:br>
-            <a:r>
-              <a:rPr lang="ru-RU" dirty="0"/>
-              <a:t>Мне есть за что Христа благодарить</a:t>
-            </a:r>
-            <a:br>
-              <a:rPr lang="ru-RU" dirty="0"/>
-            </a:br>
-            <a:r>
-              <a:rPr lang="ru-RU" dirty="0"/>
-              <a:t>Он мне купил небесное жилище</a:t>
-            </a:r>
-            <a:endParaRPr lang="en-US" dirty="0"/>
-          </a:p>
-        </p:txBody>
-      </p:sp>
-    </p:spTree>
-    <p:extLst>
-      <p:ext uri="{BB962C8B-B14F-4D97-AF65-F5344CB8AC3E}">
-        <p14:creationId xmlns:p14="http://schemas.microsoft.com/office/powerpoint/2010/main" val="3863399069"/>
-      </p:ext>
-    </p:extLst>
-  </p:cSld>
-  <p:clrMapOvr>
-    <a:masterClrMapping/>
-  </p:clrMapOvr>
-</p:sld>
-</file>
-
-<file path=ppt/slides/slide5.xml><?xml version="1.0" encoding="utf-8"?>
-<p:sld xmlns:a="http://schemas.openxmlformats.org/drawingml/2006/main" xmlns:r="http://schemas.openxmlformats.org/officeDocument/2006/relationships" xmlns:p="http://schemas.openxmlformats.org/presentationml/2006/main">
-  <p:cSld>
-    <p:spTree>
-      <p:nvGrpSpPr>
-        <p:cNvPr id="1" name=""/>
-        <p:cNvGrpSpPr/>
-        <p:nvPr/>
-      </p:nvGrpSpPr>
-      <p:grpSpPr>
-        <a:xfrm>
-          <a:off x="0" y="0"/>
-          <a:ext cx="0" cy="0"/>
-          <a:chOff x="0" y="0"/>
-          <a:chExt cx="0" cy="0"/>
-        </a:xfrm>
-      </p:grpSpPr>
-      <p:sp>
-        <p:nvSpPr>
-          <p:cNvPr id="2" name="Title 1">
-            <a:extLst>
-              <a:ext uri="{FF2B5EF4-FFF2-40B4-BE49-F238E27FC236}">
-                <a16:creationId xmlns:a16="http://schemas.microsoft.com/office/drawing/2014/main" id="{BFDA464E-37E7-7D61-6E99-ACD35979E289}"/>
-              </a:ext>
-            </a:extLst>
-          </p:cNvPr>
-          <p:cNvSpPr>
-            <a:spLocks noGrp="1"/>
-          </p:cNvSpPr>
-          <p:nvPr>
-            <p:ph type="ctrTitle"/>
-          </p:nvPr>
-        </p:nvSpPr>
-        <p:spPr>
-          <a:xfrm>
-            <a:off x="0" y="0"/>
-            <a:ext cx="12192000" cy="6858000"/>
-          </a:xfrm>
-        </p:spPr>
-        <p:txBody>
-          <a:bodyPr anchor="ctr"/>
-          <a:lstStyle/>
-          <a:p>
-            <a:r>
-              <a:rPr lang="ru-RU" dirty="0"/>
-              <a:t>Все от Него и все к Нему идет</a:t>
-            </a:r>
-            <a:br>
-              <a:rPr lang="ru-RU" dirty="0"/>
-            </a:br>
-            <a:r>
-              <a:rPr lang="ru-RU" dirty="0"/>
-              <a:t>Душа поет небесным отголоском</a:t>
-            </a:r>
-            <a:br>
-              <a:rPr lang="ru-RU" dirty="0"/>
-            </a:br>
-            <a:r>
-              <a:rPr lang="ru-RU" dirty="0"/>
-              <a:t>Придет в мой дом – я ноги обниму Того</a:t>
-            </a:r>
-            <a:br>
-              <a:rPr lang="ru-RU" dirty="0"/>
-            </a:br>
-            <a:r>
-              <a:rPr lang="ru-RU" dirty="0"/>
-              <a:t>Кто умер на кресте Голгофском</a:t>
-            </a:r>
-            <a:endParaRPr lang="en-US" dirty="0"/>
-          </a:p>
-        </p:txBody>
-      </p:sp>
-    </p:spTree>
-    <p:extLst>
-      <p:ext uri="{BB962C8B-B14F-4D97-AF65-F5344CB8AC3E}">
-        <p14:creationId xmlns:p14="http://schemas.microsoft.com/office/powerpoint/2010/main" val="3084808657"/>
-      </p:ext>
-    </p:extLst>
-  </p:cSld>
-  <p:clrMapOvr>
-    <a:masterClrMapping/>
-  </p:clrMapOvr>
-</p:sld>
-</file>
-
-<file path=ppt/slides/slide6.xml><?xml version="1.0" encoding="utf-8"?>
-<p:sld xmlns:a="http://schemas.openxmlformats.org/drawingml/2006/main" xmlns:r="http://schemas.openxmlformats.org/officeDocument/2006/relationships" xmlns:p="http://schemas.openxmlformats.org/presentationml/2006/main">
-  <p:cSld>
-    <p:spTree>
-      <p:nvGrpSpPr>
-        <p:cNvPr id="1" name=""/>
-        <p:cNvGrpSpPr/>
-        <p:nvPr/>
-      </p:nvGrpSpPr>
-      <p:grpSpPr>
-        <a:xfrm>
-          <a:off x="0" y="0"/>
-          <a:ext cx="0" cy="0"/>
-          <a:chOff x="0" y="0"/>
-          <a:chExt cx="0" cy="0"/>
-        </a:xfrm>
-      </p:grpSpPr>
-      <p:sp>
-        <p:nvSpPr>
-          <p:cNvPr id="2" name="Title 1">
-            <a:extLst>
-              <a:ext uri="{FF2B5EF4-FFF2-40B4-BE49-F238E27FC236}">
-                <a16:creationId xmlns:a16="http://schemas.microsoft.com/office/drawing/2014/main" id="{BFDA464E-37E7-7D61-6E99-ACD35979E289}"/>
-              </a:ext>
-            </a:extLst>
-          </p:cNvPr>
-          <p:cNvSpPr>
-            <a:spLocks noGrp="1"/>
-          </p:cNvSpPr>
-          <p:nvPr>
-            <p:ph type="ctrTitle"/>
-          </p:nvPr>
-        </p:nvSpPr>
-        <p:spPr>
-          <a:xfrm>
-            <a:off x="0" y="0"/>
-            <a:ext cx="12192000" cy="6858000"/>
-          </a:xfrm>
-        </p:spPr>
-        <p:txBody>
-          <a:bodyPr anchor="ctr"/>
-          <a:lstStyle/>
-          <a:p>
-            <a:r>
-              <a:rPr lang="ru-RU" dirty="0"/>
-              <a:t>Вот почему мне хочется любить</a:t>
-            </a:r>
-            <a:br>
-              <a:rPr lang="ru-RU" dirty="0"/>
-            </a:br>
-            <a:r>
-              <a:rPr lang="ru-RU" dirty="0"/>
-              <a:t>Его сильней, и искренней, и чище</a:t>
-            </a:r>
-            <a:br>
-              <a:rPr lang="ru-RU" dirty="0"/>
-            </a:br>
-            <a:r>
-              <a:rPr lang="ru-RU" dirty="0"/>
-              <a:t>Мне есть за что Христа благодарить</a:t>
-            </a:r>
-            <a:br>
-              <a:rPr lang="ru-RU" dirty="0"/>
-            </a:br>
-            <a:r>
-              <a:rPr lang="ru-RU" dirty="0"/>
-              <a:t>Он мне купил </a:t>
-            </a:r>
-            <a:r>
-              <a:rPr lang="ru-RU"/>
-              <a:t>небесное жилище</a:t>
-            </a:r>
-            <a:br>
-              <a:rPr lang="ru-RU"/>
-            </a:br>
-            <a:r>
-              <a:rPr lang="ru-RU"/>
-              <a:t>****</a:t>
-            </a:r>
-            <a:endParaRPr lang="en-US" dirty="0"/>
-          </a:p>
-        </p:txBody>
-      </p:sp>
-    </p:spTree>
-    <p:extLst>
-      <p:ext uri="{BB962C8B-B14F-4D97-AF65-F5344CB8AC3E}">
-        <p14:creationId xmlns:p14="http://schemas.microsoft.com/office/powerpoint/2010/main" val="9391457"/>
+        <p14:creationId xmlns:p14="http://schemas.microsoft.com/office/powerpoint/2010/main" val="2844641965"/>
       </p:ext>
     </p:extLst>
   </p:cSld>
@@ -4106,15 +3789,6 @@
 </file>
 
 <file path=customXml/item2.xml><?xml version="1.0" encoding="utf-8"?>
-<?mso-contentType ?>
-<FormTemplates xmlns="http://schemas.microsoft.com/sharepoint/v3/contenttype/forms">
-  <Display>DocumentLibraryForm</Display>
-  <Edit>DocumentLibraryForm</Edit>
-  <New>DocumentLibraryForm</New>
-</FormTemplates>
-</file>
-
-<file path=customXml/item3.xml><?xml version="1.0" encoding="utf-8"?>
 <p:properties xmlns:p="http://schemas.microsoft.com/office/2006/metadata/properties" xmlns:xsi="http://www.w3.org/2001/XMLSchema-instance" xmlns:pc="http://schemas.microsoft.com/office/infopath/2007/PartnerControls">
   <documentManagement>
     <lcf76f155ced4ddcb4097134ff3c332f xmlns="243caec2-9363-411a-869a-ae66e37ba368">
@@ -4125,14 +3799,49 @@
 </p:properties>
 </file>
 
+<file path=customXml/item3.xml><?xml version="1.0" encoding="utf-8"?>
+<?mso-contentType ?>
+<FormTemplates xmlns="http://schemas.microsoft.com/sharepoint/v3/contenttype/forms">
+  <Display>DocumentLibraryForm</Display>
+  <Edit>DocumentLibraryForm</Edit>
+  <New>DocumentLibraryForm</New>
+</FormTemplates>
+</file>
+
 <file path=customXml/itemProps1.xml><?xml version="1.0" encoding="utf-8"?>
-<ds:datastoreItem xmlns:ds="http://schemas.openxmlformats.org/officeDocument/2006/customXml" ds:itemID="{BC0C9DC6-6E86-4609-9710-11B7A18B24E0}"/>
+<ds:datastoreItem xmlns:ds="http://schemas.openxmlformats.org/officeDocument/2006/customXml" ds:itemID="{BC0C9DC6-6E86-4609-9710-11B7A18B24E0}">
+  <ds:schemaRefs>
+    <ds:schemaRef ds:uri="http://schemas.microsoft.com/office/2006/metadata/contentType"/>
+    <ds:schemaRef ds:uri="http://schemas.microsoft.com/office/2006/metadata/properties/metaAttributes"/>
+    <ds:schemaRef ds:uri="http://www.w3.org/2001/XMLSchema"/>
+    <ds:schemaRef ds:uri="http://schemas.microsoft.com/office/2006/metadata/properties"/>
+    <ds:schemaRef ds:uri="243caec2-9363-411a-869a-ae66e37ba368"/>
+    <ds:schemaRef ds:uri="91cc1edd-99ef-4741-81f4-b80eafe2ebea"/>
+    <ds:schemaRef ds:uri="http://schemas.microsoft.com/office/2006/documentManagement/types"/>
+    <ds:schemaRef ds:uri="http://schemas.microsoft.com/office/infopath/2007/PartnerControls"/>
+    <ds:schemaRef ds:uri="http://schemas.openxmlformats.org/package/2006/metadata/core-properties"/>
+    <ds:schemaRef ds:uri="http://purl.org/dc/elements/1.1/"/>
+    <ds:schemaRef ds:uri="http://purl.org/dc/terms/"/>
+    <ds:schemaRef ds:uri="http://schemas.microsoft.com/internal/obd"/>
+  </ds:schemaRefs>
+</ds:datastoreItem>
 </file>
 
 <file path=customXml/itemProps2.xml><?xml version="1.0" encoding="utf-8"?>
-<ds:datastoreItem xmlns:ds="http://schemas.openxmlformats.org/officeDocument/2006/customXml" ds:itemID="{58960387-ACDC-4C9B-BD8C-3B3E4AB7D362}"/>
+<ds:datastoreItem xmlns:ds="http://schemas.openxmlformats.org/officeDocument/2006/customXml" ds:itemID="{5B2702A9-D436-40BD-9F3B-5B13F1D8332D}">
+  <ds:schemaRefs>
+    <ds:schemaRef ds:uri="http://schemas.microsoft.com/office/2006/metadata/properties"/>
+    <ds:schemaRef ds:uri="http://schemas.microsoft.com/office/infopath/2007/PartnerControls"/>
+    <ds:schemaRef ds:uri="243caec2-9363-411a-869a-ae66e37ba368"/>
+    <ds:schemaRef ds:uri="91cc1edd-99ef-4741-81f4-b80eafe2ebea"/>
+  </ds:schemaRefs>
+</ds:datastoreItem>
 </file>
 
 <file path=customXml/itemProps3.xml><?xml version="1.0" encoding="utf-8"?>
-<ds:datastoreItem xmlns:ds="http://schemas.openxmlformats.org/officeDocument/2006/customXml" ds:itemID="{5B2702A9-D436-40BD-9F3B-5B13F1D8332D}"/>
+<ds:datastoreItem xmlns:ds="http://schemas.openxmlformats.org/officeDocument/2006/customXml" ds:itemID="{58960387-ACDC-4C9B-BD8C-3B3E4AB7D362}">
+  <ds:schemaRefs>
+    <ds:schemaRef ds:uri="http://schemas.microsoft.com/sharepoint/v3/contenttype/forms"/>
+  </ds:schemaRefs>
+</ds:datastoreItem>
 </file>
</xml_diff>

<commit_message>
added logic to keep slide ids in cues and id list the same
</commit_message>
<xml_diff>
--- a/powerpoint1.pptx
+++ b/powerpoint1.pptx
@@ -2,11 +2,15 @@
 <file path=ppt/presentation.xml><?xml version="1.0" encoding="utf-8"?>
 <p:presentation xmlns:a="http://schemas.openxmlformats.org/drawingml/2006/main" xmlns:r="http://schemas.openxmlformats.org/officeDocument/2006/relationships" xmlns:p="http://schemas.openxmlformats.org/presentationml/2006/main" saveSubsetFonts="1">
   <p:sldMasterIdLst>
-    <p:sldMasterId id="2147483660" r:id="rId4"/>
+    <p:sldMasterId id="2147483660" r:id="rId1"/>
   </p:sldMasterIdLst>
   <p:sldIdLst>
-    <p:sldId id="256" r:id="rId5"/>
-    <p:sldId id="257" r:id="rId6"/>
+    <p:sldId id="256" r:id="rId2"/>
+    <p:sldId id="257" r:id="rId3"/>
+    <p:sldId id="258" r:id="rId4"/>
+    <p:sldId id="259" r:id="rId5"/>
+    <p:sldId id="260" r:id="rId6"/>
+    <p:sldId id="261" r:id="rId7"/>
   </p:sldIdLst>
   <p:sldSz cx="12192000" cy="6858000"/>
   <p:notesSz cx="6858000" cy="9144000"/>
@@ -105,11 +109,6 @@
       </a:defRPr>
     </a:lvl9pPr>
   </p:defaultTextStyle>
-  <p:extLst>
-    <p:ext uri="{EFAFB233-063F-42B5-8137-9DF3F51BA10A}">
-      <p15:sldGuideLst xmlns:p15="http://schemas.microsoft.com/office/powerpoint/2012/main"/>
-    </p:ext>
-  </p:extLst>
 </p:presentation>
 </file>
 
@@ -356,7 +355,7 @@
           <a:p>
             <a:fld id="{72DA9259-FA67-4F94-A1FA-19D3606B534F}" type="datetimeFigureOut">
               <a:rPr lang="en-US" smtClean="0"/>
-              <a:t>11/27/2024</a:t>
+              <a:t>10/15/2024</a:t>
             </a:fld>
             <a:endParaRPr lang="en-US"/>
           </a:p>
@@ -526,7 +525,7 @@
           <a:p>
             <a:fld id="{72DA9259-FA67-4F94-A1FA-19D3606B534F}" type="datetimeFigureOut">
               <a:rPr lang="en-US" smtClean="0"/>
-              <a:t>11/27/2024</a:t>
+              <a:t>10/15/2024</a:t>
             </a:fld>
             <a:endParaRPr lang="en-US"/>
           </a:p>
@@ -706,7 +705,7 @@
           <a:p>
             <a:fld id="{72DA9259-FA67-4F94-A1FA-19D3606B534F}" type="datetimeFigureOut">
               <a:rPr lang="en-US" smtClean="0"/>
-              <a:t>11/27/2024</a:t>
+              <a:t>10/15/2024</a:t>
             </a:fld>
             <a:endParaRPr lang="en-US"/>
           </a:p>
@@ -876,7 +875,7 @@
           <a:p>
             <a:fld id="{72DA9259-FA67-4F94-A1FA-19D3606B534F}" type="datetimeFigureOut">
               <a:rPr lang="en-US" smtClean="0"/>
-              <a:t>11/27/2024</a:t>
+              <a:t>10/15/2024</a:t>
             </a:fld>
             <a:endParaRPr lang="en-US"/>
           </a:p>
@@ -1122,7 +1121,7 @@
           <a:p>
             <a:fld id="{72DA9259-FA67-4F94-A1FA-19D3606B534F}" type="datetimeFigureOut">
               <a:rPr lang="en-US" smtClean="0"/>
-              <a:t>11/27/2024</a:t>
+              <a:t>10/15/2024</a:t>
             </a:fld>
             <a:endParaRPr lang="en-US"/>
           </a:p>
@@ -1354,7 +1353,7 @@
           <a:p>
             <a:fld id="{72DA9259-FA67-4F94-A1FA-19D3606B534F}" type="datetimeFigureOut">
               <a:rPr lang="en-US" smtClean="0"/>
-              <a:t>11/27/2024</a:t>
+              <a:t>10/15/2024</a:t>
             </a:fld>
             <a:endParaRPr lang="en-US"/>
           </a:p>
@@ -1721,7 +1720,7 @@
           <a:p>
             <a:fld id="{72DA9259-FA67-4F94-A1FA-19D3606B534F}" type="datetimeFigureOut">
               <a:rPr lang="en-US" smtClean="0"/>
-              <a:t>11/27/2024</a:t>
+              <a:t>10/15/2024</a:t>
             </a:fld>
             <a:endParaRPr lang="en-US"/>
           </a:p>
@@ -1839,7 +1838,7 @@
           <a:p>
             <a:fld id="{72DA9259-FA67-4F94-A1FA-19D3606B534F}" type="datetimeFigureOut">
               <a:rPr lang="en-US" smtClean="0"/>
-              <a:t>11/27/2024</a:t>
+              <a:t>10/15/2024</a:t>
             </a:fld>
             <a:endParaRPr lang="en-US"/>
           </a:p>
@@ -1934,7 +1933,7 @@
           <a:p>
             <a:fld id="{72DA9259-FA67-4F94-A1FA-19D3606B534F}" type="datetimeFigureOut">
               <a:rPr lang="en-US" smtClean="0"/>
-              <a:t>11/27/2024</a:t>
+              <a:t>10/15/2024</a:t>
             </a:fld>
             <a:endParaRPr lang="en-US"/>
           </a:p>
@@ -2211,7 +2210,7 @@
           <a:p>
             <a:fld id="{72DA9259-FA67-4F94-A1FA-19D3606B534F}" type="datetimeFigureOut">
               <a:rPr lang="en-US" smtClean="0"/>
-              <a:t>11/27/2024</a:t>
+              <a:t>10/15/2024</a:t>
             </a:fld>
             <a:endParaRPr lang="en-US"/>
           </a:p>
@@ -2468,7 +2467,7 @@
           <a:p>
             <a:fld id="{72DA9259-FA67-4F94-A1FA-19D3606B534F}" type="datetimeFigureOut">
               <a:rPr lang="en-US" smtClean="0"/>
-              <a:t>11/27/2024</a:t>
+              <a:t>10/15/2024</a:t>
             </a:fld>
             <a:endParaRPr lang="en-US"/>
           </a:p>
@@ -2681,7 +2680,7 @@
           <a:p>
             <a:fld id="{72DA9259-FA67-4F94-A1FA-19D3606B534F}" type="datetimeFigureOut">
               <a:rPr lang="en-US" smtClean="0"/>
-              <a:t>11/27/2024</a:t>
+              <a:t>10/15/2024</a:t>
             </a:fld>
             <a:endParaRPr lang="en-US"/>
           </a:p>
@@ -3113,30 +3112,31 @@
           <a:lstStyle/>
           <a:p>
             <a:r>
-              <a:rPr lang="en-US" dirty="0"/>
-              <a:t>Line one</a:t>
+              <a:rPr lang="ru-RU" dirty="0"/>
+              <a:t>Мне есть за что благодарить Творца</a:t>
             </a:r>
             <a:br>
-              <a:rPr lang="en-US" dirty="0"/>
+              <a:rPr lang="ru-RU" dirty="0"/>
             </a:br>
             <a:r>
-              <a:rPr lang="en-US" dirty="0"/>
-              <a:t>Line two</a:t>
+              <a:rPr lang="ru-RU" dirty="0"/>
+              <a:t>Он снял с меня греховную проказу</a:t>
             </a:r>
             <a:br>
-              <a:rPr lang="en-US" dirty="0"/>
+              <a:rPr lang="ru-RU" dirty="0"/>
             </a:br>
             <a:r>
-              <a:rPr lang="en-US" dirty="0"/>
-              <a:t>Line three</a:t>
+              <a:rPr lang="ru-RU" dirty="0"/>
+              <a:t>О пусть теперь польется без конца</a:t>
             </a:r>
             <a:br>
-              <a:rPr lang="en-US" dirty="0"/>
+              <a:rPr lang="ru-RU" dirty="0"/>
             </a:br>
             <a:r>
-              <a:rPr lang="en-US" dirty="0"/>
-              <a:t>Line four</a:t>
-            </a:r>
+              <a:rPr lang="ru-RU" dirty="0"/>
+              <a:t>Хвала ему в поэмах и рассказах</a:t>
+            </a:r>
+            <a:endParaRPr lang="en-US" dirty="0"/>
           </a:p>
         </p:txBody>
       </p:sp>
@@ -3158,13 +3158,7 @@
   <p:cSld>
     <p:spTree>
       <p:nvGrpSpPr>
-        <p:cNvPr id="1" name="">
-          <a:extLst>
-            <a:ext uri="{FF2B5EF4-FFF2-40B4-BE49-F238E27FC236}">
-              <a16:creationId xmlns:a16="http://schemas.microsoft.com/office/drawing/2014/main" id="{FDCE8EFF-A6C0-CB3F-35A4-F1CE95D2A4FA}"/>
-            </a:ext>
-          </a:extLst>
-        </p:cNvPr>
+        <p:cNvPr id="1" name=""/>
         <p:cNvGrpSpPr/>
         <p:nvPr/>
       </p:nvGrpSpPr>
@@ -3181,7 +3175,7 @@
           <p:cNvPr id="2" name="Title 1">
             <a:extLst>
               <a:ext uri="{FF2B5EF4-FFF2-40B4-BE49-F238E27FC236}">
-                <a16:creationId xmlns:a16="http://schemas.microsoft.com/office/drawing/2014/main" id="{2E4D5ACB-51EE-D9B2-7771-23CC4E678A0B}"/>
+                <a16:creationId xmlns:a16="http://schemas.microsoft.com/office/drawing/2014/main" id="{BFDA464E-37E7-7D61-6E99-ACD35979E289}"/>
               </a:ext>
             </a:extLst>
           </p:cNvPr>
@@ -3203,57 +3197,29 @@
           <a:lstStyle/>
           <a:p>
             <a:r>
-              <a:rPr lang="en-US" dirty="0"/>
-              <a:t>Line one</a:t>
+              <a:rPr lang="ru-RU" dirty="0"/>
+              <a:t>Вот почему мне хочется любить</a:t>
             </a:r>
             <a:br>
-              <a:rPr lang="en-US" dirty="0"/>
+              <a:rPr lang="ru-RU" dirty="0"/>
             </a:br>
             <a:r>
-              <a:rPr lang="en-US" dirty="0"/>
-              <a:t>Line two</a:t>
+              <a:rPr lang="ru-RU" dirty="0"/>
+              <a:t>Его сильней, и искренней, и чище</a:t>
             </a:r>
             <a:br>
-              <a:rPr lang="en-US" dirty="0"/>
+              <a:rPr lang="ru-RU" dirty="0"/>
             </a:br>
             <a:r>
-              <a:rPr lang="en-US" dirty="0"/>
-              <a:t>Line three</a:t>
+              <a:rPr lang="ru-RU" dirty="0"/>
+              <a:t>Мне есть за что Христа благодарить</a:t>
             </a:r>
             <a:br>
-              <a:rPr lang="en-US" dirty="0"/>
+              <a:rPr lang="ru-RU" dirty="0"/>
             </a:br>
             <a:r>
-              <a:rPr lang="en-US" dirty="0"/>
-              <a:t>Line four</a:t>
-            </a:r>
-            <a:br>
-              <a:rPr lang="en-US" dirty="0"/>
-            </a:br>
-            <a:r>
-              <a:rPr lang="en-US"/>
-              <a:t>Line five</a:t>
-            </a:r>
-            <a:br>
-              <a:rPr lang="en-US"/>
-            </a:br>
-            <a:r>
-              <a:rPr lang="en-US"/>
-              <a:t>Line 6</a:t>
-            </a:r>
-            <a:br>
-              <a:rPr lang="en-US"/>
-            </a:br>
-            <a:r>
-              <a:rPr lang="en-US"/>
-              <a:t>Line 7</a:t>
-            </a:r>
-            <a:br>
-              <a:rPr lang="en-US"/>
-            </a:br>
-            <a:r>
-              <a:rPr lang="en-US"/>
-              <a:t>Line 8</a:t>
+              <a:rPr lang="ru-RU" dirty="0"/>
+              <a:t>Он мне купил небесное жилище</a:t>
             </a:r>
             <a:endParaRPr lang="en-US" dirty="0"/>
           </a:p>
@@ -3262,7 +3228,358 @@
     </p:spTree>
     <p:extLst>
       <p:ext uri="{BB962C8B-B14F-4D97-AF65-F5344CB8AC3E}">
-        <p14:creationId xmlns:p14="http://schemas.microsoft.com/office/powerpoint/2010/main" val="2844641965"/>
+        <p14:creationId xmlns:p14="http://schemas.microsoft.com/office/powerpoint/2010/main" val="3350942817"/>
+      </p:ext>
+    </p:extLst>
+  </p:cSld>
+  <p:clrMapOvr>
+    <a:masterClrMapping/>
+  </p:clrMapOvr>
+</p:sld>
+</file>
+
+<file path=ppt/slides/slide3.xml><?xml version="1.0" encoding="utf-8"?>
+<p:sld xmlns:a="http://schemas.openxmlformats.org/drawingml/2006/main" xmlns:r="http://schemas.openxmlformats.org/officeDocument/2006/relationships" xmlns:p="http://schemas.openxmlformats.org/presentationml/2006/main">
+  <p:cSld>
+    <p:spTree>
+      <p:nvGrpSpPr>
+        <p:cNvPr id="1" name=""/>
+        <p:cNvGrpSpPr/>
+        <p:nvPr/>
+      </p:nvGrpSpPr>
+      <p:grpSpPr>
+        <a:xfrm>
+          <a:off x="0" y="0"/>
+          <a:ext cx="0" cy="0"/>
+          <a:chOff x="0" y="0"/>
+          <a:chExt cx="0" cy="0"/>
+        </a:xfrm>
+      </p:grpSpPr>
+      <p:sp>
+        <p:nvSpPr>
+          <p:cNvPr id="2" name="Title 1">
+            <a:extLst>
+              <a:ext uri="{FF2B5EF4-FFF2-40B4-BE49-F238E27FC236}">
+                <a16:creationId xmlns:a16="http://schemas.microsoft.com/office/drawing/2014/main" id="{BFDA464E-37E7-7D61-6E99-ACD35979E289}"/>
+              </a:ext>
+            </a:extLst>
+          </p:cNvPr>
+          <p:cNvSpPr>
+            <a:spLocks noGrp="1"/>
+          </p:cNvSpPr>
+          <p:nvPr>
+            <p:ph type="ctrTitle"/>
+          </p:nvPr>
+        </p:nvSpPr>
+        <p:spPr>
+          <a:xfrm>
+            <a:off x="0" y="0"/>
+            <a:ext cx="12192000" cy="6858000"/>
+          </a:xfrm>
+        </p:spPr>
+        <p:txBody>
+          <a:bodyPr anchor="ctr"/>
+          <a:lstStyle/>
+          <a:p>
+            <a:r>
+              <a:rPr lang="ru-RU" dirty="0"/>
+              <a:t>Душа взывать к Христу не устает</a:t>
+            </a:r>
+            <a:br>
+              <a:rPr lang="ru-RU" dirty="0"/>
+            </a:br>
+            <a:r>
+              <a:rPr lang="ru-RU" dirty="0"/>
+              <a:t>Где падала – прощения просила</a:t>
+            </a:r>
+            <a:br>
+              <a:rPr lang="ru-RU" dirty="0"/>
+            </a:br>
+            <a:r>
+              <a:rPr lang="ru-RU" dirty="0"/>
+              <a:t>Ведь Он в беде мне руку подает</a:t>
+            </a:r>
+            <a:br>
+              <a:rPr lang="ru-RU" dirty="0"/>
+            </a:br>
+            <a:r>
+              <a:rPr lang="ru-RU" dirty="0"/>
+              <a:t>Ведь Он один – прибежище и сила</a:t>
+            </a:r>
+            <a:endParaRPr lang="en-US" dirty="0"/>
+          </a:p>
+        </p:txBody>
+      </p:sp>
+    </p:spTree>
+    <p:extLst>
+      <p:ext uri="{BB962C8B-B14F-4D97-AF65-F5344CB8AC3E}">
+        <p14:creationId xmlns:p14="http://schemas.microsoft.com/office/powerpoint/2010/main" val="292070290"/>
+      </p:ext>
+    </p:extLst>
+  </p:cSld>
+  <p:clrMapOvr>
+    <a:masterClrMapping/>
+  </p:clrMapOvr>
+</p:sld>
+</file>
+
+<file path=ppt/slides/slide4.xml><?xml version="1.0" encoding="utf-8"?>
+<p:sld xmlns:a="http://schemas.openxmlformats.org/drawingml/2006/main" xmlns:r="http://schemas.openxmlformats.org/officeDocument/2006/relationships" xmlns:p="http://schemas.openxmlformats.org/presentationml/2006/main">
+  <p:cSld>
+    <p:spTree>
+      <p:nvGrpSpPr>
+        <p:cNvPr id="1" name=""/>
+        <p:cNvGrpSpPr/>
+        <p:nvPr/>
+      </p:nvGrpSpPr>
+      <p:grpSpPr>
+        <a:xfrm>
+          <a:off x="0" y="0"/>
+          <a:ext cx="0" cy="0"/>
+          <a:chOff x="0" y="0"/>
+          <a:chExt cx="0" cy="0"/>
+        </a:xfrm>
+      </p:grpSpPr>
+      <p:sp>
+        <p:nvSpPr>
+          <p:cNvPr id="2" name="Title 1">
+            <a:extLst>
+              <a:ext uri="{FF2B5EF4-FFF2-40B4-BE49-F238E27FC236}">
+                <a16:creationId xmlns:a16="http://schemas.microsoft.com/office/drawing/2014/main" id="{BFDA464E-37E7-7D61-6E99-ACD35979E289}"/>
+              </a:ext>
+            </a:extLst>
+          </p:cNvPr>
+          <p:cNvSpPr>
+            <a:spLocks noGrp="1"/>
+          </p:cNvSpPr>
+          <p:nvPr>
+            <p:ph type="ctrTitle"/>
+          </p:nvPr>
+        </p:nvSpPr>
+        <p:spPr>
+          <a:xfrm>
+            <a:off x="0" y="0"/>
+            <a:ext cx="12192000" cy="6858000"/>
+          </a:xfrm>
+        </p:spPr>
+        <p:txBody>
+          <a:bodyPr anchor="ctr"/>
+          <a:lstStyle/>
+          <a:p>
+            <a:r>
+              <a:rPr lang="ru-RU" dirty="0"/>
+              <a:t>Вот почему мне хочется любить</a:t>
+            </a:r>
+            <a:br>
+              <a:rPr lang="ru-RU" dirty="0"/>
+            </a:br>
+            <a:r>
+              <a:rPr lang="ru-RU" dirty="0"/>
+              <a:t>Его сильней, и искренней, и чище</a:t>
+            </a:r>
+            <a:br>
+              <a:rPr lang="ru-RU" dirty="0"/>
+            </a:br>
+            <a:r>
+              <a:rPr lang="ru-RU" dirty="0"/>
+              <a:t>Мне есть за что Христа благодарить</a:t>
+            </a:r>
+            <a:br>
+              <a:rPr lang="ru-RU" dirty="0"/>
+            </a:br>
+            <a:r>
+              <a:rPr lang="ru-RU" dirty="0"/>
+              <a:t>Он мне купил небесное жилище</a:t>
+            </a:r>
+            <a:endParaRPr lang="en-US" dirty="0"/>
+          </a:p>
+        </p:txBody>
+      </p:sp>
+    </p:spTree>
+    <p:extLst>
+      <p:ext uri="{BB962C8B-B14F-4D97-AF65-F5344CB8AC3E}">
+        <p14:creationId xmlns:p14="http://schemas.microsoft.com/office/powerpoint/2010/main" val="3863399069"/>
+      </p:ext>
+    </p:extLst>
+  </p:cSld>
+  <p:clrMapOvr>
+    <a:masterClrMapping/>
+  </p:clrMapOvr>
+</p:sld>
+</file>
+
+<file path=ppt/slides/slide5.xml><?xml version="1.0" encoding="utf-8"?>
+<p:sld xmlns:a="http://schemas.openxmlformats.org/drawingml/2006/main" xmlns:r="http://schemas.openxmlformats.org/officeDocument/2006/relationships" xmlns:p="http://schemas.openxmlformats.org/presentationml/2006/main">
+  <p:cSld>
+    <p:spTree>
+      <p:nvGrpSpPr>
+        <p:cNvPr id="1" name=""/>
+        <p:cNvGrpSpPr/>
+        <p:nvPr/>
+      </p:nvGrpSpPr>
+      <p:grpSpPr>
+        <a:xfrm>
+          <a:off x="0" y="0"/>
+          <a:ext cx="0" cy="0"/>
+          <a:chOff x="0" y="0"/>
+          <a:chExt cx="0" cy="0"/>
+        </a:xfrm>
+      </p:grpSpPr>
+      <p:sp>
+        <p:nvSpPr>
+          <p:cNvPr id="2" name="Title 1">
+            <a:extLst>
+              <a:ext uri="{FF2B5EF4-FFF2-40B4-BE49-F238E27FC236}">
+                <a16:creationId xmlns:a16="http://schemas.microsoft.com/office/drawing/2014/main" id="{BFDA464E-37E7-7D61-6E99-ACD35979E289}"/>
+              </a:ext>
+            </a:extLst>
+          </p:cNvPr>
+          <p:cNvSpPr>
+            <a:spLocks noGrp="1"/>
+          </p:cNvSpPr>
+          <p:nvPr>
+            <p:ph type="ctrTitle"/>
+          </p:nvPr>
+        </p:nvSpPr>
+        <p:spPr>
+          <a:xfrm>
+            <a:off x="0" y="0"/>
+            <a:ext cx="12192000" cy="6858000"/>
+          </a:xfrm>
+        </p:spPr>
+        <p:txBody>
+          <a:bodyPr anchor="ctr"/>
+          <a:lstStyle/>
+          <a:p>
+            <a:r>
+              <a:rPr lang="ru-RU" dirty="0"/>
+              <a:t>Все от Него и все к Нему идет</a:t>
+            </a:r>
+            <a:br>
+              <a:rPr lang="ru-RU" dirty="0"/>
+            </a:br>
+            <a:r>
+              <a:rPr lang="ru-RU" dirty="0"/>
+              <a:t>Душа поет небесным отголоском</a:t>
+            </a:r>
+            <a:br>
+              <a:rPr lang="ru-RU" dirty="0"/>
+            </a:br>
+            <a:r>
+              <a:rPr lang="ru-RU" dirty="0"/>
+              <a:t>Придет в мой дом – я ноги обниму Того</a:t>
+            </a:r>
+            <a:br>
+              <a:rPr lang="ru-RU" dirty="0"/>
+            </a:br>
+            <a:r>
+              <a:rPr lang="ru-RU" dirty="0"/>
+              <a:t>Кто умер на кресте Голгофском</a:t>
+            </a:r>
+            <a:endParaRPr lang="en-US" dirty="0"/>
+          </a:p>
+        </p:txBody>
+      </p:sp>
+    </p:spTree>
+    <p:extLst>
+      <p:ext uri="{BB962C8B-B14F-4D97-AF65-F5344CB8AC3E}">
+        <p14:creationId xmlns:p14="http://schemas.microsoft.com/office/powerpoint/2010/main" val="3084808657"/>
+      </p:ext>
+    </p:extLst>
+  </p:cSld>
+  <p:clrMapOvr>
+    <a:masterClrMapping/>
+  </p:clrMapOvr>
+</p:sld>
+</file>
+
+<file path=ppt/slides/slide6.xml><?xml version="1.0" encoding="utf-8"?>
+<p:sld xmlns:a="http://schemas.openxmlformats.org/drawingml/2006/main" xmlns:r="http://schemas.openxmlformats.org/officeDocument/2006/relationships" xmlns:p="http://schemas.openxmlformats.org/presentationml/2006/main">
+  <p:cSld>
+    <p:spTree>
+      <p:nvGrpSpPr>
+        <p:cNvPr id="1" name=""/>
+        <p:cNvGrpSpPr/>
+        <p:nvPr/>
+      </p:nvGrpSpPr>
+      <p:grpSpPr>
+        <a:xfrm>
+          <a:off x="0" y="0"/>
+          <a:ext cx="0" cy="0"/>
+          <a:chOff x="0" y="0"/>
+          <a:chExt cx="0" cy="0"/>
+        </a:xfrm>
+      </p:grpSpPr>
+      <p:sp>
+        <p:nvSpPr>
+          <p:cNvPr id="2" name="Title 1">
+            <a:extLst>
+              <a:ext uri="{FF2B5EF4-FFF2-40B4-BE49-F238E27FC236}">
+                <a16:creationId xmlns:a16="http://schemas.microsoft.com/office/drawing/2014/main" id="{BFDA464E-37E7-7D61-6E99-ACD35979E289}"/>
+              </a:ext>
+            </a:extLst>
+          </p:cNvPr>
+          <p:cNvSpPr>
+            <a:spLocks noGrp="1"/>
+          </p:cNvSpPr>
+          <p:nvPr>
+            <p:ph type="ctrTitle"/>
+          </p:nvPr>
+        </p:nvSpPr>
+        <p:spPr>
+          <a:xfrm>
+            <a:off x="0" y="0"/>
+            <a:ext cx="12192000" cy="6858000"/>
+          </a:xfrm>
+        </p:spPr>
+        <p:txBody>
+          <a:bodyPr anchor="ctr"/>
+          <a:lstStyle/>
+          <a:p>
+            <a:r>
+              <a:rPr lang="ru-RU" dirty="0"/>
+              <a:t>Вот почему мне хочется любить</a:t>
+            </a:r>
+            <a:br>
+              <a:rPr lang="ru-RU" dirty="0"/>
+            </a:br>
+            <a:r>
+              <a:rPr lang="ru-RU" dirty="0"/>
+              <a:t>Его сильней, и искренней, и чище</a:t>
+            </a:r>
+            <a:br>
+              <a:rPr lang="ru-RU" dirty="0"/>
+            </a:br>
+            <a:r>
+              <a:rPr lang="ru-RU" dirty="0"/>
+              <a:t>Мне есть за что Христа благодарить</a:t>
+            </a:r>
+            <a:br>
+              <a:rPr lang="ru-RU" dirty="0"/>
+            </a:br>
+            <a:r>
+              <a:rPr lang="ru-RU" dirty="0"/>
+              <a:t>Он мне купил </a:t>
+            </a:r>
+            <a:r>
+              <a:rPr lang="ru-RU"/>
+              <a:t>небесное жилище</a:t>
+            </a:r>
+            <a:br>
+              <a:rPr lang="ru-RU"/>
+            </a:br>
+            <a:r>
+              <a:rPr lang="ru-RU"/>
+              <a:t>****</a:t>
+            </a:r>
+            <a:endParaRPr lang="en-US" dirty="0"/>
+          </a:p>
+        </p:txBody>
+      </p:sp>
+    </p:spTree>
+    <p:extLst>
+      <p:ext uri="{BB962C8B-B14F-4D97-AF65-F5344CB8AC3E}">
+        <p14:creationId xmlns:p14="http://schemas.microsoft.com/office/powerpoint/2010/main" val="9391457"/>
       </p:ext>
     </p:extLst>
   </p:cSld>
@@ -3789,6 +4106,15 @@
 </file>
 
 <file path=customXml/item2.xml><?xml version="1.0" encoding="utf-8"?>
+<?mso-contentType ?>
+<FormTemplates xmlns="http://schemas.microsoft.com/sharepoint/v3/contenttype/forms">
+  <Display>DocumentLibraryForm</Display>
+  <Edit>DocumentLibraryForm</Edit>
+  <New>DocumentLibraryForm</New>
+</FormTemplates>
+</file>
+
+<file path=customXml/item3.xml><?xml version="1.0" encoding="utf-8"?>
 <p:properties xmlns:p="http://schemas.microsoft.com/office/2006/metadata/properties" xmlns:xsi="http://www.w3.org/2001/XMLSchema-instance" xmlns:pc="http://schemas.microsoft.com/office/infopath/2007/PartnerControls">
   <documentManagement>
     <lcf76f155ced4ddcb4097134ff3c332f xmlns="243caec2-9363-411a-869a-ae66e37ba368">
@@ -3799,49 +4125,14 @@
 </p:properties>
 </file>
 
-<file path=customXml/item3.xml><?xml version="1.0" encoding="utf-8"?>
-<?mso-contentType ?>
-<FormTemplates xmlns="http://schemas.microsoft.com/sharepoint/v3/contenttype/forms">
-  <Display>DocumentLibraryForm</Display>
-  <Edit>DocumentLibraryForm</Edit>
-  <New>DocumentLibraryForm</New>
-</FormTemplates>
-</file>
-
 <file path=customXml/itemProps1.xml><?xml version="1.0" encoding="utf-8"?>
-<ds:datastoreItem xmlns:ds="http://schemas.openxmlformats.org/officeDocument/2006/customXml" ds:itemID="{BC0C9DC6-6E86-4609-9710-11B7A18B24E0}">
-  <ds:schemaRefs>
-    <ds:schemaRef ds:uri="http://schemas.microsoft.com/office/2006/metadata/contentType"/>
-    <ds:schemaRef ds:uri="http://schemas.microsoft.com/office/2006/metadata/properties/metaAttributes"/>
-    <ds:schemaRef ds:uri="http://www.w3.org/2001/XMLSchema"/>
-    <ds:schemaRef ds:uri="http://schemas.microsoft.com/office/2006/metadata/properties"/>
-    <ds:schemaRef ds:uri="243caec2-9363-411a-869a-ae66e37ba368"/>
-    <ds:schemaRef ds:uri="91cc1edd-99ef-4741-81f4-b80eafe2ebea"/>
-    <ds:schemaRef ds:uri="http://schemas.microsoft.com/office/2006/documentManagement/types"/>
-    <ds:schemaRef ds:uri="http://schemas.microsoft.com/office/infopath/2007/PartnerControls"/>
-    <ds:schemaRef ds:uri="http://schemas.openxmlformats.org/package/2006/metadata/core-properties"/>
-    <ds:schemaRef ds:uri="http://purl.org/dc/elements/1.1/"/>
-    <ds:schemaRef ds:uri="http://purl.org/dc/terms/"/>
-    <ds:schemaRef ds:uri="http://schemas.microsoft.com/internal/obd"/>
-  </ds:schemaRefs>
-</ds:datastoreItem>
+<ds:datastoreItem xmlns:ds="http://schemas.openxmlformats.org/officeDocument/2006/customXml" ds:itemID="{BC0C9DC6-6E86-4609-9710-11B7A18B24E0}"/>
 </file>
 
 <file path=customXml/itemProps2.xml><?xml version="1.0" encoding="utf-8"?>
-<ds:datastoreItem xmlns:ds="http://schemas.openxmlformats.org/officeDocument/2006/customXml" ds:itemID="{5B2702A9-D436-40BD-9F3B-5B13F1D8332D}">
-  <ds:schemaRefs>
-    <ds:schemaRef ds:uri="http://schemas.microsoft.com/office/2006/metadata/properties"/>
-    <ds:schemaRef ds:uri="http://schemas.microsoft.com/office/infopath/2007/PartnerControls"/>
-    <ds:schemaRef ds:uri="243caec2-9363-411a-869a-ae66e37ba368"/>
-    <ds:schemaRef ds:uri="91cc1edd-99ef-4741-81f4-b80eafe2ebea"/>
-  </ds:schemaRefs>
-</ds:datastoreItem>
+<ds:datastoreItem xmlns:ds="http://schemas.openxmlformats.org/officeDocument/2006/customXml" ds:itemID="{58960387-ACDC-4C9B-BD8C-3B3E4AB7D362}"/>
 </file>
 
 <file path=customXml/itemProps3.xml><?xml version="1.0" encoding="utf-8"?>
-<ds:datastoreItem xmlns:ds="http://schemas.openxmlformats.org/officeDocument/2006/customXml" ds:itemID="{58960387-ACDC-4C9B-BD8C-3B3E4AB7D362}">
-  <ds:schemaRefs>
-    <ds:schemaRef ds:uri="http://schemas.microsoft.com/sharepoint/v3/contenttype/forms"/>
-  </ds:schemaRefs>
-</ds:datastoreItem>
+<ds:datastoreItem xmlns:ds="http://schemas.openxmlformats.org/officeDocument/2006/customXml" ds:itemID="{5B2702A9-D436-40BD-9F3B-5B13F1D8332D}"/>
 </file>
</xml_diff>